<commit_message>
Add image file contain results and conclusions
</commit_message>
<xml_diff>
--- a/report/report.pptx
+++ b/report/report.pptx
@@ -17190,7 +17190,7 @@
           <a:p>
             <a:fld id="{FAD6D332-67D3-403F-B983-DBBE4A295E62}" type="datetimeFigureOut">
               <a:rPr lang="en-US" smtClean="0"/>
-              <a:t>12/18/2022</a:t>
+              <a:t>6/14/2023</a:t>
             </a:fld>
             <a:endParaRPr lang="en-US"/>
           </a:p>
@@ -18173,7 +18173,7 @@
           <a:effectLst/>
           <a:extLst>
             <a:ext uri="{91240B29-F687-4f45-9708-019B960494DF}">
-              <a14:hiddenLine xmlns="" xmlns:a14="http://schemas.microsoft.com/office/drawing/2010/main" w="9525">
+              <a14:hiddenLine xmlns:a14="http://schemas.microsoft.com/office/drawing/2010/main" xmlns="" w="9525">
                 <a:solidFill>
                   <a:srgbClr val="000000"/>
                 </a:solidFill>
@@ -18365,7 +18365,7 @@
           <a:p>
             <a:fld id="{C4250CE6-C69E-41E5-B159-DFF4D765433C}" type="datetimeFigureOut">
               <a:rPr lang="en-US" smtClean="0"/>
-              <a:t>12/18/2022</a:t>
+              <a:t>6/14/2023</a:t>
             </a:fld>
             <a:endParaRPr lang="en-US"/>
           </a:p>
@@ -18683,7 +18683,7 @@
           <a:p>
             <a:fld id="{C4250CE6-C69E-41E5-B159-DFF4D765433C}" type="datetimeFigureOut">
               <a:rPr lang="en-US" smtClean="0"/>
-              <a:t>12/18/2022</a:t>
+              <a:t>6/14/2023</a:t>
             </a:fld>
             <a:endParaRPr lang="en-US"/>
           </a:p>
@@ -19171,7 +19171,7 @@
           <a:p>
             <a:fld id="{C4250CE6-C69E-41E5-B159-DFF4D765433C}" type="datetimeFigureOut">
               <a:rPr lang="en-US" smtClean="0"/>
-              <a:t>12/18/2022</a:t>
+              <a:t>6/14/2023</a:t>
             </a:fld>
             <a:endParaRPr lang="en-US"/>
           </a:p>
@@ -19540,7 +19540,7 @@
           <a:p>
             <a:fld id="{C4250CE6-C69E-41E5-B159-DFF4D765433C}" type="datetimeFigureOut">
               <a:rPr lang="en-US" smtClean="0"/>
-              <a:t>12/18/2022</a:t>
+              <a:t>6/14/2023</a:t>
             </a:fld>
             <a:endParaRPr lang="en-US"/>
           </a:p>
@@ -19695,7 +19695,7 @@
           <a:ln/>
           <a:extLst>
             <a:ext uri="{91240B29-F687-4f45-9708-019B960494DF}">
-              <a14:hiddenLine xmlns="" xmlns:a14="http://schemas.microsoft.com/office/drawing/2010/main" w="9525">
+              <a14:hiddenLine xmlns:a14="http://schemas.microsoft.com/office/drawing/2010/main" xmlns="" w="9525">
                 <a:solidFill>
                   <a:srgbClr val="000000"/>
                 </a:solidFill>
@@ -19813,7 +19813,7 @@
           <a:p>
             <a:fld id="{C4250CE6-C69E-41E5-B159-DFF4D765433C}" type="datetimeFigureOut">
               <a:rPr lang="en-US" smtClean="0"/>
-              <a:t>12/18/2022</a:t>
+              <a:t>6/14/2023</a:t>
             </a:fld>
             <a:endParaRPr lang="en-US"/>
           </a:p>
@@ -19970,7 +19970,7 @@
           <a:ln/>
           <a:extLst>
             <a:ext uri="{91240B29-F687-4f45-9708-019B960494DF}">
-              <a14:hiddenLine xmlns="" xmlns:a14="http://schemas.microsoft.com/office/drawing/2010/main" w="9525">
+              <a14:hiddenLine xmlns:a14="http://schemas.microsoft.com/office/drawing/2010/main" xmlns="" w="9525">
                 <a:solidFill>
                   <a:srgbClr val="000000"/>
                 </a:solidFill>
@@ -20098,7 +20098,7 @@
           <a:p>
             <a:fld id="{C4250CE6-C69E-41E5-B159-DFF4D765433C}" type="datetimeFigureOut">
               <a:rPr lang="en-US" smtClean="0"/>
-              <a:t>12/18/2022</a:t>
+              <a:t>6/14/2023</a:t>
             </a:fld>
             <a:endParaRPr lang="en-US"/>
           </a:p>
@@ -20385,7 +20385,7 @@
           <a:p>
             <a:fld id="{C4250CE6-C69E-41E5-B159-DFF4D765433C}" type="datetimeFigureOut">
               <a:rPr lang="en-US" smtClean="0"/>
-              <a:t>12/18/2022</a:t>
+              <a:t>6/14/2023</a:t>
             </a:fld>
             <a:endParaRPr lang="en-US"/>
           </a:p>
@@ -20593,7 +20593,7 @@
           <a:p>
             <a:fld id="{C4250CE6-C69E-41E5-B159-DFF4D765433C}" type="datetimeFigureOut">
               <a:rPr lang="en-US" smtClean="0"/>
-              <a:t>12/18/2022</a:t>
+              <a:t>6/14/2023</a:t>
             </a:fld>
             <a:endParaRPr lang="en-US"/>
           </a:p>
@@ -20936,7 +20936,7 @@
           <a:p>
             <a:fld id="{C4250CE6-C69E-41E5-B159-DFF4D765433C}" type="datetimeFigureOut">
               <a:rPr lang="en-US" smtClean="0"/>
-              <a:t>12/18/2022</a:t>
+              <a:t>6/14/2023</a:t>
             </a:fld>
             <a:endParaRPr lang="en-US"/>
           </a:p>
@@ -21211,7 +21211,7 @@
           <a:p>
             <a:fld id="{C4250CE6-C69E-41E5-B159-DFF4D765433C}" type="datetimeFigureOut">
               <a:rPr lang="en-US" smtClean="0"/>
-              <a:t>12/18/2022</a:t>
+              <a:t>6/14/2023</a:t>
             </a:fld>
             <a:endParaRPr lang="en-US"/>
           </a:p>
@@ -21590,7 +21590,7 @@
           <a:p>
             <a:fld id="{C4250CE6-C69E-41E5-B159-DFF4D765433C}" type="datetimeFigureOut">
               <a:rPr lang="en-US" smtClean="0"/>
-              <a:t>12/18/2022</a:t>
+              <a:t>6/14/2023</a:t>
             </a:fld>
             <a:endParaRPr lang="en-US"/>
           </a:p>
@@ -21745,7 +21745,7 @@
           <a:ln/>
           <a:extLst>
             <a:ext uri="{91240B29-F687-4f45-9708-019B960494DF}">
-              <a14:hiddenLine xmlns="" xmlns:a14="http://schemas.microsoft.com/office/drawing/2010/main" w="9525">
+              <a14:hiddenLine xmlns:a14="http://schemas.microsoft.com/office/drawing/2010/main" xmlns="" w="9525">
                 <a:solidFill>
                   <a:srgbClr val="000000"/>
                 </a:solidFill>
@@ -21873,7 +21873,7 @@
           <a:p>
             <a:fld id="{C4250CE6-C69E-41E5-B159-DFF4D765433C}" type="datetimeFigureOut">
               <a:rPr lang="en-US" smtClean="0"/>
-              <a:t>12/18/2022</a:t>
+              <a:t>6/14/2023</a:t>
             </a:fld>
             <a:endParaRPr lang="en-US"/>
           </a:p>
@@ -21991,7 +21991,7 @@
           <a:p>
             <a:fld id="{C4250CE6-C69E-41E5-B159-DFF4D765433C}" type="datetimeFigureOut">
               <a:rPr lang="en-US" smtClean="0"/>
-              <a:t>12/18/2022</a:t>
+              <a:t>6/14/2023</a:t>
             </a:fld>
             <a:endParaRPr lang="en-US"/>
           </a:p>
@@ -22162,7 +22162,7 @@
           <a:p>
             <a:fld id="{C4250CE6-C69E-41E5-B159-DFF4D765433C}" type="datetimeFigureOut">
               <a:rPr lang="en-US" smtClean="0"/>
-              <a:t>12/18/2022</a:t>
+              <a:t>6/14/2023</a:t>
             </a:fld>
             <a:endParaRPr lang="en-US"/>
           </a:p>
@@ -22516,7 +22516,7 @@
           <a:p>
             <a:fld id="{C4250CE6-C69E-41E5-B159-DFF4D765433C}" type="datetimeFigureOut">
               <a:rPr lang="en-US" smtClean="0"/>
-              <a:t>12/18/2022</a:t>
+              <a:t>6/14/2023</a:t>
             </a:fld>
             <a:endParaRPr lang="en-US"/>
           </a:p>
@@ -22893,7 +22893,7 @@
           <a:p>
             <a:fld id="{C4250CE6-C69E-41E5-B159-DFF4D765433C}" type="datetimeFigureOut">
               <a:rPr lang="en-US" smtClean="0"/>
-              <a:t>12/18/2022</a:t>
+              <a:t>6/14/2023</a:t>
             </a:fld>
             <a:endParaRPr lang="en-US"/>
           </a:p>
@@ -23063,7 +23063,7 @@
           <a:p>
             <a:fld id="{C4250CE6-C69E-41E5-B159-DFF4D765433C}" type="datetimeFigureOut">
               <a:rPr lang="en-US" smtClean="0"/>
-              <a:t>12/18/2022</a:t>
+              <a:t>6/14/2023</a:t>
             </a:fld>
             <a:endParaRPr lang="en-US"/>
           </a:p>
@@ -23319,7 +23319,7 @@
           <a:p>
             <a:fld id="{C4250CE6-C69E-41E5-B159-DFF4D765433C}" type="datetimeFigureOut">
               <a:rPr lang="en-US" smtClean="0"/>
-              <a:t>12/18/2022</a:t>
+              <a:t>6/14/2023</a:t>
             </a:fld>
             <a:endParaRPr lang="en-US"/>
           </a:p>
@@ -23662,7 +23662,7 @@
           <a:p>
             <a:fld id="{C4250CE6-C69E-41E5-B159-DFF4D765433C}" type="datetimeFigureOut">
               <a:rPr lang="en-US" smtClean="0"/>
-              <a:t>12/18/2022</a:t>
+              <a:t>6/14/2023</a:t>
             </a:fld>
             <a:endParaRPr lang="en-US"/>
           </a:p>
@@ -23817,7 +23817,7 @@
           <a:ln/>
           <a:extLst>
             <a:ext uri="{91240B29-F687-4f45-9708-019B960494DF}">
-              <a14:hiddenLine xmlns="" xmlns:a14="http://schemas.microsoft.com/office/drawing/2010/main" w="9525">
+              <a14:hiddenLine xmlns:a14="http://schemas.microsoft.com/office/drawing/2010/main" xmlns="" w="9525">
                 <a:solidFill>
                   <a:srgbClr val="000000"/>
                 </a:solidFill>
@@ -24001,7 +24001,7 @@
           <a:p>
             <a:fld id="{C4250CE6-C69E-41E5-B159-DFF4D765433C}" type="datetimeFigureOut">
               <a:rPr lang="en-US" smtClean="0"/>
-              <a:t>12/18/2022</a:t>
+              <a:t>6/14/2023</a:t>
             </a:fld>
             <a:endParaRPr lang="en-US"/>
           </a:p>
@@ -24156,7 +24156,7 @@
           <a:ln/>
           <a:extLst>
             <a:ext uri="{91240B29-F687-4f45-9708-019B960494DF}">
-              <a14:hiddenLine xmlns="" xmlns:a14="http://schemas.microsoft.com/office/drawing/2010/main" w="9525">
+              <a14:hiddenLine xmlns:a14="http://schemas.microsoft.com/office/drawing/2010/main" xmlns="" w="9525">
                 <a:solidFill>
                   <a:srgbClr val="000000"/>
                 </a:solidFill>
@@ -24478,7 +24478,7 @@
           <a:p>
             <a:fld id="{C4250CE6-C69E-41E5-B159-DFF4D765433C}" type="datetimeFigureOut">
               <a:rPr lang="en-US" smtClean="0"/>
-              <a:t>12/18/2022</a:t>
+              <a:t>6/14/2023</a:t>
             </a:fld>
             <a:endParaRPr lang="en-US"/>
           </a:p>
@@ -24633,7 +24633,7 @@
           <a:ln/>
           <a:extLst>
             <a:ext uri="{91240B29-F687-4f45-9708-019B960494DF}">
-              <a14:hiddenLine xmlns="" xmlns:a14="http://schemas.microsoft.com/office/drawing/2010/main" w="9525">
+              <a14:hiddenLine xmlns:a14="http://schemas.microsoft.com/office/drawing/2010/main" xmlns="" w="9525">
                 <a:solidFill>
                   <a:srgbClr val="000000"/>
                 </a:solidFill>
@@ -24699,7 +24699,7 @@
           <a:p>
             <a:fld id="{C4250CE6-C69E-41E5-B159-DFF4D765433C}" type="datetimeFigureOut">
               <a:rPr lang="en-US" smtClean="0"/>
-              <a:t>12/18/2022</a:t>
+              <a:t>6/14/2023</a:t>
             </a:fld>
             <a:endParaRPr lang="en-US"/>
           </a:p>
@@ -24794,7 +24794,7 @@
           <a:p>
             <a:fld id="{C4250CE6-C69E-41E5-B159-DFF4D765433C}" type="datetimeFigureOut">
               <a:rPr lang="en-US" smtClean="0"/>
-              <a:t>12/18/2022</a:t>
+              <a:t>6/14/2023</a:t>
             </a:fld>
             <a:endParaRPr lang="en-US"/>
           </a:p>
@@ -25062,7 +25062,7 @@
           <a:ln/>
           <a:extLst>
             <a:ext uri="{91240B29-F687-4f45-9708-019B960494DF}">
-              <a14:hiddenLine xmlns="" xmlns:a14="http://schemas.microsoft.com/office/drawing/2010/main" w="9525">
+              <a14:hiddenLine xmlns:a14="http://schemas.microsoft.com/office/drawing/2010/main" xmlns="" w="9525">
                 <a:solidFill>
                   <a:srgbClr val="000000"/>
                 </a:solidFill>
@@ -25261,7 +25261,7 @@
           <a:p>
             <a:fld id="{C4250CE6-C69E-41E5-B159-DFF4D765433C}" type="datetimeFigureOut">
               <a:rPr lang="en-US" smtClean="0"/>
-              <a:t>12/18/2022</a:t>
+              <a:t>6/14/2023</a:t>
             </a:fld>
             <a:endParaRPr lang="en-US"/>
           </a:p>
@@ -25574,7 +25574,7 @@
           <a:p>
             <a:fld id="{C4250CE6-C69E-41E5-B159-DFF4D765433C}" type="datetimeFigureOut">
               <a:rPr lang="en-US" smtClean="0"/>
-              <a:t>12/18/2022</a:t>
+              <a:t>6/14/2023</a:t>
             </a:fld>
             <a:endParaRPr lang="en-US"/>
           </a:p>
@@ -25844,7 +25844,7 @@
           <a:p>
             <a:fld id="{C4250CE6-C69E-41E5-B159-DFF4D765433C}" type="datetimeFigureOut">
               <a:rPr lang="en-US" smtClean="0"/>
-              <a:t>12/18/2022</a:t>
+              <a:t>6/14/2023</a:t>
             </a:fld>
             <a:endParaRPr lang="en-US"/>
           </a:p>
@@ -26502,7 +26502,7 @@
           <a:p>
             <a:fld id="{C4250CE6-C69E-41E5-B159-DFF4D765433C}" type="datetimeFigureOut">
               <a:rPr lang="en-US" smtClean="0"/>
-              <a:t>12/18/2022</a:t>
+              <a:t>6/14/2023</a:t>
             </a:fld>
             <a:endParaRPr lang="en-US"/>
           </a:p>
@@ -28356,15 +28356,21 @@
             <p:ph type="title"/>
           </p:nvPr>
         </p:nvSpPr>
-        <p:spPr/>
+        <p:spPr>
+          <a:xfrm>
+            <a:off x="818712" y="352920"/>
+            <a:ext cx="10571998" cy="970450"/>
+          </a:xfrm>
+        </p:spPr>
         <p:txBody>
           <a:bodyPr/>
           <a:lstStyle/>
           <a:p>
             <a:r>
               <a:rPr lang="en-US"/>
-              <a:t>Dữ liệu</a:t>
+              <a:t>Data</a:t>
             </a:r>
+            <a:endParaRPr lang="en-US" dirty="0"/>
           </a:p>
         </p:txBody>
       </p:sp>

</xml_diff>